<commit_message>
work on presentation slide
</commit_message>
<xml_diff>
--- a/Physics Project Presentation.pptx
+++ b/Physics Project Presentation.pptx
@@ -113,6 +113,11 @@
       </a:defRPr>
     </a:lvl9pPr>
   </p:defaultTextStyle>
+  <p:extLst>
+    <p:ext uri="{EFAFB233-063F-42B5-8137-9DF3F51BA10A}">
+      <p15:sldGuideLst xmlns:p15="http://schemas.microsoft.com/office/powerpoint/2012/main"/>
+    </p:ext>
+  </p:extLst>
 </p:presentation>
 </file>
 
@@ -6193,7 +6198,10 @@
           <a:bodyPr/>
           <a:lstStyle/>
           <a:p>
-            <a:endParaRPr lang="en-US"/>
+            <a:r>
+              <a:rPr lang="en-US" dirty="0"/>
+              <a:t>Kristopher Keller</a:t>
+            </a:r>
           </a:p>
         </p:txBody>
       </p:sp>
@@ -6218,7 +6226,28 @@
           <a:bodyPr/>
           <a:lstStyle/>
           <a:p>
-            <a:endParaRPr lang="en-US"/>
+            <a:pPr marL="342900" indent="-342900">
+              <a:buFont typeface="Arial" panose="020B0604020202020204" pitchFamily="34" charset="0"/>
+              <a:buChar char="•"/>
+            </a:pPr>
+            <a:r>
+              <a:rPr lang="en-US" dirty="0"/>
+              <a:t>Worked on player script, fight player script, cannon script, cannonball script, and camera controller script.</a:t>
+            </a:r>
+          </a:p>
+          <a:p>
+            <a:pPr marL="342900" indent="-342900">
+              <a:buFont typeface="Arial" panose="020B0604020202020204" pitchFamily="34" charset="0"/>
+              <a:buChar char="•"/>
+            </a:pPr>
+            <a:r>
+              <a:rPr lang="en-US" dirty="0"/>
+              <a:t>Worked on temporary art that is not to be in the </a:t>
+            </a:r>
+            <a:r>
+              <a:rPr lang="en-US"/>
+              <a:t>full release of the game.</a:t>
+            </a:r>
           </a:p>
         </p:txBody>
       </p:sp>

</xml_diff>

<commit_message>
Nick wrote a story
</commit_message>
<xml_diff>
--- a/Physics Project Presentation.pptx
+++ b/Physics Project Presentation.pptx
@@ -5863,7 +5863,15 @@
           <a:bodyPr/>
           <a:lstStyle/>
           <a:p>
-            <a:endParaRPr lang="en-US"/>
+            <a:r>
+              <a:rPr lang="en-US" dirty="0"/>
+              <a:t>Captain Reilly Jr., son of Captain Reilly Sr., followed his father’s pirate career. His whole life revolved around escaping poverty after his father plundered the </a:t>
+            </a:r>
+            <a:r>
+              <a:rPr lang="en-US"/>
+              <a:t>wrong ship. </a:t>
+            </a:r>
+            <a:endParaRPr lang="en-US" dirty="0"/>
           </a:p>
         </p:txBody>
       </p:sp>

</xml_diff>